<commit_message>
Presentazione PPT modifiche grafiche lievi, aggiunta breve descrzione springboot.
</commit_message>
<xml_diff>
--- a/Varie/NaTour21.pptx
+++ b/Varie/NaTour21.pptx
@@ -116,7 +116,7 @@
   <p:extLst>
     <p:ext uri="{521415D9-36F7-43E2-AB2F-B90AF26B5E84}">
       <p14:sectionLst xmlns:p14="http://schemas.microsoft.com/office/powerpoint/2010/main">
-        <p14:section name="Sezione predefinita" id="{104C9464-4C57-44E8-8AF5-59102C876DA1}">
+        <p14:section name="Locandina" id="{104C9464-4C57-44E8-8AF5-59102C876DA1}">
           <p14:sldIdLst>
             <p14:sldId id="258"/>
           </p14:sldIdLst>
@@ -317,7 +317,7 @@
           <a:p>
             <a:fld id="{D1B804D9-6A3C-4A49-AACC-26C8A614B2B6}" type="datetimeFigureOut">
               <a:rPr lang="it-IT" smtClean="0"/>
-              <a:t>18/03/2022</a:t>
+              <a:t>19/03/2022</a:t>
             </a:fld>
             <a:endParaRPr lang="it-IT"/>
           </a:p>
@@ -515,7 +515,7 @@
           <a:p>
             <a:fld id="{D1B804D9-6A3C-4A49-AACC-26C8A614B2B6}" type="datetimeFigureOut">
               <a:rPr lang="it-IT" smtClean="0"/>
-              <a:t>18/03/2022</a:t>
+              <a:t>19/03/2022</a:t>
             </a:fld>
             <a:endParaRPr lang="it-IT"/>
           </a:p>
@@ -723,7 +723,7 @@
           <a:p>
             <a:fld id="{D1B804D9-6A3C-4A49-AACC-26C8A614B2B6}" type="datetimeFigureOut">
               <a:rPr lang="it-IT" smtClean="0"/>
-              <a:t>18/03/2022</a:t>
+              <a:t>19/03/2022</a:t>
             </a:fld>
             <a:endParaRPr lang="it-IT"/>
           </a:p>
@@ -921,7 +921,7 @@
           <a:p>
             <a:fld id="{D1B804D9-6A3C-4A49-AACC-26C8A614B2B6}" type="datetimeFigureOut">
               <a:rPr lang="it-IT" smtClean="0"/>
-              <a:t>18/03/2022</a:t>
+              <a:t>19/03/2022</a:t>
             </a:fld>
             <a:endParaRPr lang="it-IT"/>
           </a:p>
@@ -1196,7 +1196,7 @@
           <a:p>
             <a:fld id="{D1B804D9-6A3C-4A49-AACC-26C8A614B2B6}" type="datetimeFigureOut">
               <a:rPr lang="it-IT" smtClean="0"/>
-              <a:t>18/03/2022</a:t>
+              <a:t>19/03/2022</a:t>
             </a:fld>
             <a:endParaRPr lang="it-IT"/>
           </a:p>
@@ -1461,7 +1461,7 @@
           <a:p>
             <a:fld id="{D1B804D9-6A3C-4A49-AACC-26C8A614B2B6}" type="datetimeFigureOut">
               <a:rPr lang="it-IT" smtClean="0"/>
-              <a:t>18/03/2022</a:t>
+              <a:t>19/03/2022</a:t>
             </a:fld>
             <a:endParaRPr lang="it-IT"/>
           </a:p>
@@ -1873,7 +1873,7 @@
           <a:p>
             <a:fld id="{D1B804D9-6A3C-4A49-AACC-26C8A614B2B6}" type="datetimeFigureOut">
               <a:rPr lang="it-IT" smtClean="0"/>
-              <a:t>18/03/2022</a:t>
+              <a:t>19/03/2022</a:t>
             </a:fld>
             <a:endParaRPr lang="it-IT"/>
           </a:p>
@@ -2014,7 +2014,7 @@
           <a:p>
             <a:fld id="{D1B804D9-6A3C-4A49-AACC-26C8A614B2B6}" type="datetimeFigureOut">
               <a:rPr lang="it-IT" smtClean="0"/>
-              <a:t>18/03/2022</a:t>
+              <a:t>19/03/2022</a:t>
             </a:fld>
             <a:endParaRPr lang="it-IT"/>
           </a:p>
@@ -2127,7 +2127,7 @@
           <a:p>
             <a:fld id="{D1B804D9-6A3C-4A49-AACC-26C8A614B2B6}" type="datetimeFigureOut">
               <a:rPr lang="it-IT" smtClean="0"/>
-              <a:t>18/03/2022</a:t>
+              <a:t>19/03/2022</a:t>
             </a:fld>
             <a:endParaRPr lang="it-IT"/>
           </a:p>
@@ -2438,7 +2438,7 @@
           <a:p>
             <a:fld id="{D1B804D9-6A3C-4A49-AACC-26C8A614B2B6}" type="datetimeFigureOut">
               <a:rPr lang="it-IT" smtClean="0"/>
-              <a:t>18/03/2022</a:t>
+              <a:t>19/03/2022</a:t>
             </a:fld>
             <a:endParaRPr lang="it-IT"/>
           </a:p>
@@ -2726,7 +2726,7 @@
           <a:p>
             <a:fld id="{D1B804D9-6A3C-4A49-AACC-26C8A614B2B6}" type="datetimeFigureOut">
               <a:rPr lang="it-IT" smtClean="0"/>
-              <a:t>18/03/2022</a:t>
+              <a:t>19/03/2022</a:t>
             </a:fld>
             <a:endParaRPr lang="it-IT"/>
           </a:p>
@@ -2967,7 +2967,7 @@
           <a:p>
             <a:fld id="{D1B804D9-6A3C-4A49-AACC-26C8A614B2B6}" type="datetimeFigureOut">
               <a:rPr lang="it-IT" smtClean="0"/>
-              <a:t>18/03/2022</a:t>
+              <a:t>19/03/2022</a:t>
             </a:fld>
             <a:endParaRPr lang="it-IT"/>
           </a:p>
@@ -5607,8 +5607,8 @@
         </p:blipFill>
         <p:spPr>
           <a:xfrm>
-            <a:off x="6546226" y="1606690"/>
-            <a:ext cx="2096561" cy="2117189"/>
+            <a:off x="6646188" y="1709274"/>
+            <a:ext cx="2030390" cy="2050367"/>
           </a:xfrm>
           <a:prstGeom prst="ellipse">
             <a:avLst/>
@@ -5653,7 +5653,7 @@
         </p:nvSpPr>
         <p:spPr>
           <a:xfrm>
-            <a:off x="6989194" y="3734347"/>
+            <a:off x="6929534" y="3761714"/>
             <a:ext cx="1463697" cy="338554"/>
           </a:xfrm>
           <a:prstGeom prst="rect">
@@ -5693,7 +5693,7 @@
         </p:nvSpPr>
         <p:spPr>
           <a:xfrm>
-            <a:off x="6585955" y="4234427"/>
+            <a:off x="6586530" y="4234427"/>
             <a:ext cx="2270173" cy="338554"/>
           </a:xfrm>
           <a:prstGeom prst="rect">
@@ -7815,8 +7815,8 @@
         </p:nvSpPr>
         <p:spPr>
           <a:xfrm>
-            <a:off x="1426246" y="6402797"/>
-            <a:ext cx="830677" cy="246221"/>
+            <a:off x="1985426" y="6230559"/>
+            <a:ext cx="1851789" cy="246221"/>
           </a:xfrm>
           <a:prstGeom prst="rect">
             <a:avLst/>
@@ -7852,14 +7852,17 @@
                   </a:extLst>
                 </a:hlinkClick>
               </a:rPr>
-              <a:t>qui</a:t>
+              <a:t>Outdoor Magazine</a:t>
             </a:r>
-            <a:endParaRPr lang="it-IT" sz="1000" dirty="0">
-              <a:solidFill>
-                <a:schemeClr val="bg1"/>
-              </a:solidFill>
-              <a:latin typeface="Montserrat" panose="00000500000000000000" pitchFamily="2" charset="0"/>
-            </a:endParaRPr>
+            <a:r>
+              <a:rPr lang="it-IT" sz="1000" dirty="0">
+                <a:solidFill>
+                  <a:schemeClr val="bg1"/>
+                </a:solidFill>
+                <a:latin typeface="Montserrat" panose="00000500000000000000" pitchFamily="2" charset="0"/>
+              </a:rPr>
+              <a:t>.</a:t>
+            </a:r>
           </a:p>
         </p:txBody>
       </p:sp>
@@ -13729,6 +13732,46 @@
           </a:p>
         </p:txBody>
       </p:sp>
+      <p:pic>
+        <p:nvPicPr>
+          <p:cNvPr id="46" name="Elemento grafico 45" descr="Aggiorna con riempimento a tinta unita">
+            <a:hlinkClick r:id="rId19" action="ppaction://hlinksldjump"/>
+            <a:extLst>
+              <a:ext uri="{FF2B5EF4-FFF2-40B4-BE49-F238E27FC236}">
+                <a16:creationId xmlns:a16="http://schemas.microsoft.com/office/drawing/2014/main" id="{F9AC578A-463F-44A3-B75C-B05C95B511C3}"/>
+              </a:ext>
+            </a:extLst>
+          </p:cNvPr>
+          <p:cNvPicPr>
+            <a:picLocks noChangeAspect="1"/>
+          </p:cNvPicPr>
+          <p:nvPr/>
+        </p:nvPicPr>
+        <p:blipFill>
+          <a:blip r:embed="rId28">
+            <a:extLst>
+              <a:ext uri="{28A0092B-C50C-407E-A947-70E740481C1C}">
+                <a14:useLocalDpi xmlns:a14="http://schemas.microsoft.com/office/drawing/2010/main" val="0"/>
+              </a:ext>
+              <a:ext uri="{96DAC541-7B7A-43D3-8B79-37D633B846F1}">
+                <asvg:svgBlip xmlns:asvg="http://schemas.microsoft.com/office/drawing/2016/SVG/main" r:embed="rId29"/>
+              </a:ext>
+            </a:extLst>
+          </a:blip>
+          <a:stretch>
+            <a:fillRect/>
+          </a:stretch>
+        </p:blipFill>
+        <p:spPr>
+          <a:xfrm>
+            <a:off x="11055693" y="5752208"/>
+            <a:ext cx="914400" cy="914400"/>
+          </a:xfrm>
+          <a:prstGeom prst="rect">
+            <a:avLst/>
+          </a:prstGeom>
+        </p:spPr>
+      </p:pic>
     </p:spTree>
     <p:extLst>
       <p:ext uri="{BB962C8B-B14F-4D97-AF65-F5344CB8AC3E}">
@@ -14890,7 +14933,7 @@
         <p:spPr>
           <a:xfrm>
             <a:off x="2210480" y="2957365"/>
-            <a:ext cx="2531675" cy="307777"/>
+            <a:ext cx="7213739" cy="523220"/>
           </a:xfrm>
           <a:prstGeom prst="rect">
             <a:avLst/>
@@ -14910,7 +14953,25 @@
                 </a:solidFill>
                 <a:latin typeface="Montserrat" panose="00000500000000000000" pitchFamily="2" charset="0"/>
               </a:rPr>
-              <a:t>Descrizione di springboot</a:t>
+              <a:t>Spring Boot semplifica la creazione di applicazioni basate su Spring autonome e di livello produttivo che puoi semplicemente «just </a:t>
+            </a:r>
+            <a:r>
+              <a:rPr lang="it-IT" sz="1400" dirty="0" err="1">
+                <a:solidFill>
+                  <a:schemeClr val="bg1"/>
+                </a:solidFill>
+                <a:latin typeface="Montserrat" panose="00000500000000000000" pitchFamily="2" charset="0"/>
+              </a:rPr>
+              <a:t>run</a:t>
+            </a:r>
+            <a:r>
+              <a:rPr lang="it-IT" sz="1400" dirty="0">
+                <a:solidFill>
+                  <a:schemeClr val="bg1"/>
+                </a:solidFill>
+                <a:latin typeface="Montserrat" panose="00000500000000000000" pitchFamily="2" charset="0"/>
+              </a:rPr>
+              <a:t>».</a:t>
             </a:r>
           </a:p>
         </p:txBody>
@@ -14990,7 +15051,7 @@
         </p:nvSpPr>
         <p:spPr>
           <a:xfrm>
-            <a:off x="3049439" y="5999857"/>
+            <a:off x="2990510" y="6039938"/>
             <a:ext cx="6871623" cy="307777"/>
           </a:xfrm>
           <a:prstGeom prst="rect">
@@ -15039,8 +15100,8 @@
           <p:nvPr/>
         </p:nvSpPr>
         <p:spPr>
-          <a:xfrm>
-            <a:off x="2212745" y="3961741"/>
+          <a:xfrm rot="20966354">
+            <a:off x="2303418" y="5114361"/>
             <a:ext cx="3973805" cy="307777"/>
           </a:xfrm>
           <a:prstGeom prst="rect">
@@ -15089,9 +15150,9 @@
           <p:nvPr/>
         </p:nvSpPr>
         <p:spPr>
-          <a:xfrm>
-            <a:off x="5518659" y="5009132"/>
-            <a:ext cx="2282642" cy="307777"/>
+          <a:xfrm rot="20785221">
+            <a:off x="2131924" y="4201869"/>
+            <a:ext cx="2445470" cy="307777"/>
           </a:xfrm>
           <a:prstGeom prst="rect">
             <a:avLst/>
@@ -15111,7 +15172,7 @@
                 </a:solidFill>
                 <a:latin typeface="Montserrat" panose="00000500000000000000" pitchFamily="2" charset="0"/>
               </a:rPr>
-              <a:t>E’ un framework di java</a:t>
+              <a:t>E’ un framework di Java</a:t>
             </a:r>
             <a:endParaRPr lang="it-IT" sz="1400" b="0" i="0" dirty="0">
               <a:solidFill>
@@ -15136,9 +15197,9 @@
           <p:nvPr/>
         </p:nvSpPr>
         <p:spPr>
-          <a:xfrm>
-            <a:off x="8154101" y="3905779"/>
-            <a:ext cx="3091389" cy="800219"/>
+          <a:xfrm rot="928404">
+            <a:off x="8252542" y="4360912"/>
+            <a:ext cx="3091389" cy="307777"/>
           </a:xfrm>
           <a:prstGeom prst="rect">
             <a:avLst/>
@@ -15160,6 +15221,46 @@
               </a:rPr>
               <a:t>Efficiente per le creare REST API</a:t>
             </a:r>
+          </a:p>
+        </p:txBody>
+      </p:sp>
+      <p:sp>
+        <p:nvSpPr>
+          <p:cNvPr id="2" name="CasellaDiTesto 1">
+            <a:extLst>
+              <a:ext uri="{FF2B5EF4-FFF2-40B4-BE49-F238E27FC236}">
+                <a16:creationId xmlns:a16="http://schemas.microsoft.com/office/drawing/2014/main" id="{B72F950C-0D0F-4976-A687-A2030E40ADCF}"/>
+              </a:ext>
+            </a:extLst>
+          </p:cNvPr>
+          <p:cNvSpPr txBox="1"/>
+          <p:nvPr/>
+        </p:nvSpPr>
+        <p:spPr>
+          <a:xfrm>
+            <a:off x="5445124" y="3919077"/>
+            <a:ext cx="1962397" cy="523220"/>
+          </a:xfrm>
+          <a:prstGeom prst="rect">
+            <a:avLst/>
+          </a:prstGeom>
+          <a:noFill/>
+        </p:spPr>
+        <p:txBody>
+          <a:bodyPr wrap="none" rtlCol="0">
+            <a:spAutoFit/>
+          </a:bodyPr>
+          <a:lstStyle/>
+          <a:p>
+            <a:r>
+              <a:rPr lang="it-IT" sz="1400" dirty="0">
+                <a:solidFill>
+                  <a:schemeClr val="bg1"/>
+                </a:solidFill>
+                <a:latin typeface="Montserrat" panose="00000500000000000000" pitchFamily="2" charset="0"/>
+              </a:rPr>
+              <a:t>S</a:t>
+            </a:r>
             <a:r>
               <a:rPr lang="it-IT" sz="1400" b="0" i="0" dirty="0">
                 <a:solidFill>
@@ -15168,7 +15269,7 @@
                 <a:effectLst/>
                 <a:latin typeface="Montserrat" panose="00000500000000000000" pitchFamily="2" charset="0"/>
               </a:rPr>
-              <a:t> Semplice scalabilità</a:t>
+              <a:t>emplice scalabilità</a:t>
             </a:r>
             <a:endParaRPr lang="it-IT" sz="1400" dirty="0">
               <a:solidFill>
@@ -15178,7 +15279,49 @@
             </a:endParaRPr>
           </a:p>
           <a:p>
-            <a:endParaRPr lang="it-IT" dirty="0"/>
+            <a:endParaRPr lang="it-IT" sz="1400" dirty="0"/>
+          </a:p>
+        </p:txBody>
+      </p:sp>
+      <p:sp>
+        <p:nvSpPr>
+          <p:cNvPr id="3" name="CasellaDiTesto 2">
+            <a:extLst>
+              <a:ext uri="{FF2B5EF4-FFF2-40B4-BE49-F238E27FC236}">
+                <a16:creationId xmlns:a16="http://schemas.microsoft.com/office/drawing/2014/main" id="{E5450FCF-8F68-4F6F-830D-FCAEAFD53087}"/>
+              </a:ext>
+            </a:extLst>
+          </p:cNvPr>
+          <p:cNvSpPr txBox="1"/>
+          <p:nvPr/>
+        </p:nvSpPr>
+        <p:spPr>
+          <a:xfrm rot="801151">
+            <a:off x="7117853" y="5129918"/>
+            <a:ext cx="3658374" cy="307777"/>
+          </a:xfrm>
+          <a:prstGeom prst="rect">
+            <a:avLst/>
+          </a:prstGeom>
+          <a:noFill/>
+        </p:spPr>
+        <p:txBody>
+          <a:bodyPr wrap="none" rtlCol="0">
+            <a:spAutoFit/>
+          </a:bodyPr>
+          <a:lstStyle/>
+          <a:p>
+            <a:pPr algn="just"/>
+            <a:r>
+              <a:rPr lang="it-IT" sz="1400" dirty="0">
+                <a:solidFill>
+                  <a:schemeClr val="bg1"/>
+                </a:solidFill>
+                <a:latin typeface="Montserrat" panose="00000500000000000000" pitchFamily="2" charset="0"/>
+                <a:cs typeface="Mongolian Baiti" panose="03000500000000000000" pitchFamily="66" charset="0"/>
+              </a:rPr>
+              <a:t>Grande varietà di moduli ed estensioni</a:t>
+            </a:r>
           </a:p>
         </p:txBody>
       </p:sp>
@@ -16680,7 +16823,7 @@
         <p:spPr>
           <a:xfrm>
             <a:off x="2234262" y="3371250"/>
-            <a:ext cx="4756452" cy="307777"/>
+            <a:ext cx="4756452" cy="523220"/>
           </a:xfrm>
           <a:prstGeom prst="rect">
             <a:avLst/>
@@ -16700,8 +16843,23 @@
                 </a:solidFill>
                 <a:latin typeface="Montserrat" panose="00000500000000000000" pitchFamily="2" charset="0"/>
               </a:rPr>
-              <a:t>Recuperare le immagini dei servizi</a:t>
+              <a:t>Lato cloud si collegherà quasi totalmente a discorso </a:t>
             </a:r>
+            <a:r>
+              <a:rPr lang="it-IT" sz="1400" dirty="0" err="1">
+                <a:solidFill>
+                  <a:schemeClr val="bg1"/>
+                </a:solidFill>
+                <a:latin typeface="Montserrat" panose="00000500000000000000" pitchFamily="2" charset="0"/>
+              </a:rPr>
+              <a:t>backend</a:t>
+            </a:r>
+            <a:endParaRPr lang="it-IT" sz="1400" dirty="0">
+              <a:solidFill>
+                <a:schemeClr val="bg1"/>
+              </a:solidFill>
+              <a:latin typeface="Montserrat" panose="00000500000000000000" pitchFamily="2" charset="0"/>
+            </a:endParaRPr>
           </a:p>
         </p:txBody>
       </p:sp>

</xml_diff>